<commit_message>
add bycrpt and headers and login as middle ware
</commit_message>
<xml_diff>
--- a/outro/griveance.pptx
+++ b/outro/griveance.pptx
@@ -10,6 +10,7 @@
     <p:sldId id="258" r:id="rId4"/>
     <p:sldId id="259" r:id="rId5"/>
     <p:sldId id="260" r:id="rId6"/>
+    <p:sldId id="261" r:id="rId7"/>
   </p:sldIdLst>
   <p:sldSz cx="12192000" cy="6858000"/>
   <p:notesSz cx="6858000" cy="9144000"/>
@@ -108,6 +109,11 @@
       </a:defRPr>
     </a:lvl9pPr>
   </p:defaultTextStyle>
+  <p:extLst>
+    <p:ext uri="{EFAFB233-063F-42B5-8137-9DF3F51BA10A}">
+      <p15:sldGuideLst xmlns:p15="http://schemas.microsoft.com/office/powerpoint/2012/main"/>
+    </p:ext>
+  </p:extLst>
 </p:presentation>
 </file>
 
@@ -260,7 +266,7 @@
           <a:p>
             <a:fld id="{95515539-2437-4CC5-AA98-8DE744FBE704}" type="datetimeFigureOut">
               <a:rPr lang="en-IN" smtClean="0"/>
-              <a:t>09-10-2023</a:t>
+              <a:t>16-10-2023</a:t>
             </a:fld>
             <a:endParaRPr lang="en-IN"/>
           </a:p>
@@ -460,7 +466,7 @@
           <a:p>
             <a:fld id="{95515539-2437-4CC5-AA98-8DE744FBE704}" type="datetimeFigureOut">
               <a:rPr lang="en-IN" smtClean="0"/>
-              <a:t>09-10-2023</a:t>
+              <a:t>16-10-2023</a:t>
             </a:fld>
             <a:endParaRPr lang="en-IN"/>
           </a:p>
@@ -670,7 +676,7 @@
           <a:p>
             <a:fld id="{95515539-2437-4CC5-AA98-8DE744FBE704}" type="datetimeFigureOut">
               <a:rPr lang="en-IN" smtClean="0"/>
-              <a:t>09-10-2023</a:t>
+              <a:t>16-10-2023</a:t>
             </a:fld>
             <a:endParaRPr lang="en-IN"/>
           </a:p>
@@ -870,7 +876,7 @@
           <a:p>
             <a:fld id="{95515539-2437-4CC5-AA98-8DE744FBE704}" type="datetimeFigureOut">
               <a:rPr lang="en-IN" smtClean="0"/>
-              <a:t>09-10-2023</a:t>
+              <a:t>16-10-2023</a:t>
             </a:fld>
             <a:endParaRPr lang="en-IN"/>
           </a:p>
@@ -1146,7 +1152,7 @@
           <a:p>
             <a:fld id="{95515539-2437-4CC5-AA98-8DE744FBE704}" type="datetimeFigureOut">
               <a:rPr lang="en-IN" smtClean="0"/>
-              <a:t>09-10-2023</a:t>
+              <a:t>16-10-2023</a:t>
             </a:fld>
             <a:endParaRPr lang="en-IN"/>
           </a:p>
@@ -1414,7 +1420,7 @@
           <a:p>
             <a:fld id="{95515539-2437-4CC5-AA98-8DE744FBE704}" type="datetimeFigureOut">
               <a:rPr lang="en-IN" smtClean="0"/>
-              <a:t>09-10-2023</a:t>
+              <a:t>16-10-2023</a:t>
             </a:fld>
             <a:endParaRPr lang="en-IN"/>
           </a:p>
@@ -1829,7 +1835,7 @@
           <a:p>
             <a:fld id="{95515539-2437-4CC5-AA98-8DE744FBE704}" type="datetimeFigureOut">
               <a:rPr lang="en-IN" smtClean="0"/>
-              <a:t>09-10-2023</a:t>
+              <a:t>16-10-2023</a:t>
             </a:fld>
             <a:endParaRPr lang="en-IN"/>
           </a:p>
@@ -1971,7 +1977,7 @@
           <a:p>
             <a:fld id="{95515539-2437-4CC5-AA98-8DE744FBE704}" type="datetimeFigureOut">
               <a:rPr lang="en-IN" smtClean="0"/>
-              <a:t>09-10-2023</a:t>
+              <a:t>16-10-2023</a:t>
             </a:fld>
             <a:endParaRPr lang="en-IN"/>
           </a:p>
@@ -2084,7 +2090,7 @@
           <a:p>
             <a:fld id="{95515539-2437-4CC5-AA98-8DE744FBE704}" type="datetimeFigureOut">
               <a:rPr lang="en-IN" smtClean="0"/>
-              <a:t>09-10-2023</a:t>
+              <a:t>16-10-2023</a:t>
             </a:fld>
             <a:endParaRPr lang="en-IN"/>
           </a:p>
@@ -2397,7 +2403,7 @@
           <a:p>
             <a:fld id="{95515539-2437-4CC5-AA98-8DE744FBE704}" type="datetimeFigureOut">
               <a:rPr lang="en-IN" smtClean="0"/>
-              <a:t>09-10-2023</a:t>
+              <a:t>16-10-2023</a:t>
             </a:fld>
             <a:endParaRPr lang="en-IN"/>
           </a:p>
@@ -2686,7 +2692,7 @@
           <a:p>
             <a:fld id="{95515539-2437-4CC5-AA98-8DE744FBE704}" type="datetimeFigureOut">
               <a:rPr lang="en-IN" smtClean="0"/>
-              <a:t>09-10-2023</a:t>
+              <a:t>16-10-2023</a:t>
             </a:fld>
             <a:endParaRPr lang="en-IN"/>
           </a:p>
@@ -2929,7 +2935,7 @@
           <a:p>
             <a:fld id="{95515539-2437-4CC5-AA98-8DE744FBE704}" type="datetimeFigureOut">
               <a:rPr lang="en-IN" smtClean="0"/>
-              <a:t>09-10-2023</a:t>
+              <a:t>16-10-2023</a:t>
             </a:fld>
             <a:endParaRPr lang="en-IN"/>
           </a:p>
@@ -3882,28 +3888,6 @@
           </a:bodyPr>
           <a:lstStyle/>
           <a:p>
-            <a:pPr marL="571500" indent="-571500">
-              <a:buFont typeface="Arial" panose="020B0604020202020204" pitchFamily="34" charset="0"/>
-              <a:buChar char="•"/>
-            </a:pPr>
-            <a:r>
-              <a:rPr lang="en-US" sz="4400" b="0" cap="none" spc="0" dirty="0">
-                <a:ln w="0"/>
-                <a:solidFill>
-                  <a:schemeClr val="accent1"/>
-                </a:solidFill>
-                <a:effectLst>
-                  <a:outerShdw blurRad="38100" dist="25400" dir="5400000" algn="ctr" rotWithShape="0">
-                    <a:srgbClr val="6E747A">
-                      <a:alpha val="43000"/>
-                    </a:srgbClr>
-                  </a:outerShdw>
-                </a:effectLst>
-              </a:rPr>
-              <a:t>Sahil verma</a:t>
-            </a:r>
-          </a:p>
-          <a:p>
             <a:pPr marL="571500" indent="-571500" algn="ctr">
               <a:buFont typeface="Arial" panose="020B0604020202020204" pitchFamily="34" charset="0"/>
               <a:buChar char="•"/>
@@ -3953,6 +3937,28 @@
                 </a:outerShdw>
               </a:effectLst>
             </a:endParaRPr>
+          </a:p>
+          <a:p>
+            <a:pPr marL="571500" indent="-571500">
+              <a:buFont typeface="Arial" panose="020B0604020202020204" pitchFamily="34" charset="0"/>
+              <a:buChar char="•"/>
+            </a:pPr>
+            <a:r>
+              <a:rPr lang="en-US" sz="4400" b="0" cap="none" spc="0" dirty="0">
+                <a:ln w="0"/>
+                <a:solidFill>
+                  <a:schemeClr val="accent1"/>
+                </a:solidFill>
+                <a:effectLst>
+                  <a:outerShdw blurRad="38100" dist="25400" dir="5400000" algn="ctr" rotWithShape="0">
+                    <a:srgbClr val="6E747A">
+                      <a:alpha val="43000"/>
+                    </a:srgbClr>
+                  </a:outerShdw>
+                </a:effectLst>
+              </a:rPr>
+              <a:t>Sahil Verma</a:t>
+            </a:r>
           </a:p>
           <a:p>
             <a:pPr marL="571500" indent="-571500">
@@ -5164,6 +5170,75 @@
     <p:extLst>
       <p:ext uri="{BB962C8B-B14F-4D97-AF65-F5344CB8AC3E}">
         <p14:creationId xmlns:p14="http://schemas.microsoft.com/office/powerpoint/2010/main" val="4204665282"/>
+      </p:ext>
+    </p:extLst>
+  </p:cSld>
+  <p:clrMapOvr>
+    <a:masterClrMapping/>
+  </p:clrMapOvr>
+</p:sld>
+</file>
+
+<file path=ppt/slides/slide6.xml><?xml version="1.0" encoding="utf-8"?>
+<p:sld xmlns:a="http://schemas.openxmlformats.org/drawingml/2006/main" xmlns:r="http://schemas.openxmlformats.org/officeDocument/2006/relationships" xmlns:p="http://schemas.openxmlformats.org/presentationml/2006/main">
+  <p:cSld>
+    <p:spTree>
+      <p:nvGrpSpPr>
+        <p:cNvPr id="1" name=""/>
+        <p:cNvGrpSpPr/>
+        <p:nvPr/>
+      </p:nvGrpSpPr>
+      <p:grpSpPr>
+        <a:xfrm>
+          <a:off x="0" y="0"/>
+          <a:ext cx="0" cy="0"/>
+          <a:chOff x="0" y="0"/>
+          <a:chExt cx="0" cy="0"/>
+        </a:xfrm>
+      </p:grpSpPr>
+      <p:sp>
+        <p:nvSpPr>
+          <p:cNvPr id="2" name="Rectangle 1">
+            <a:extLst>
+              <a:ext uri="{FF2B5EF4-FFF2-40B4-BE49-F238E27FC236}">
+                <a16:creationId xmlns:a16="http://schemas.microsoft.com/office/drawing/2014/main" id="{C4813181-FA1E-1FFA-9229-75A69F33EE57}"/>
+              </a:ext>
+            </a:extLst>
+          </p:cNvPr>
+          <p:cNvSpPr/>
+          <p:nvPr/>
+        </p:nvSpPr>
+        <p:spPr>
+          <a:xfrm>
+            <a:off x="652704" y="173335"/>
+            <a:ext cx="2462534" cy="923330"/>
+          </a:xfrm>
+          <a:prstGeom prst="rect">
+            <a:avLst/>
+          </a:prstGeom>
+          <a:noFill/>
+        </p:spPr>
+        <p:txBody>
+          <a:bodyPr wrap="none" lIns="91440" tIns="45720" rIns="91440" bIns="45720">
+            <a:spAutoFit/>
+          </a:bodyPr>
+          <a:lstStyle/>
+          <a:p>
+            <a:pPr algn="ctr"/>
+            <a:r>
+              <a:rPr lang="en-IN" sz="5400" b="1" i="0" u="sng" dirty="0">
+                <a:effectLst/>
+                <a:latin typeface="Söhne"/>
+              </a:rPr>
+              <a:t>Design :</a:t>
+            </a:r>
+          </a:p>
+        </p:txBody>
+      </p:sp>
+    </p:spTree>
+    <p:extLst>
+      <p:ext uri="{BB962C8B-B14F-4D97-AF65-F5344CB8AC3E}">
+        <p14:creationId xmlns:p14="http://schemas.microsoft.com/office/powerpoint/2010/main" val="49780476"/>
       </p:ext>
     </p:extLst>
   </p:cSld>

</xml_diff>